<commit_message>
modified the hover event, notskew class, and proj class on portfolio home page
</commit_message>
<xml_diff>
--- a/assets/images/pptx.pptx
+++ b/assets/images/pptx.pptx
@@ -244,7 +244,7 @@
           <a:p>
             <a:fld id="{E67F1A49-5343-410B-89E8-F003A9BFD862}" type="datetimeFigureOut">
               <a:rPr lang="en-US" smtClean="0"/>
-              <a:t>6/8/2019</a:t>
+              <a:t>6/14/2019</a:t>
             </a:fld>
             <a:endParaRPr lang="en-US"/>
           </a:p>
@@ -414,7 +414,7 @@
           <a:p>
             <a:fld id="{E67F1A49-5343-410B-89E8-F003A9BFD862}" type="datetimeFigureOut">
               <a:rPr lang="en-US" smtClean="0"/>
-              <a:t>6/8/2019</a:t>
+              <a:t>6/14/2019</a:t>
             </a:fld>
             <a:endParaRPr lang="en-US"/>
           </a:p>
@@ -594,7 +594,7 @@
           <a:p>
             <a:fld id="{E67F1A49-5343-410B-89E8-F003A9BFD862}" type="datetimeFigureOut">
               <a:rPr lang="en-US" smtClean="0"/>
-              <a:t>6/8/2019</a:t>
+              <a:t>6/14/2019</a:t>
             </a:fld>
             <a:endParaRPr lang="en-US"/>
           </a:p>
@@ -764,7 +764,7 @@
           <a:p>
             <a:fld id="{E67F1A49-5343-410B-89E8-F003A9BFD862}" type="datetimeFigureOut">
               <a:rPr lang="en-US" smtClean="0"/>
-              <a:t>6/8/2019</a:t>
+              <a:t>6/14/2019</a:t>
             </a:fld>
             <a:endParaRPr lang="en-US"/>
           </a:p>
@@ -1010,7 +1010,7 @@
           <a:p>
             <a:fld id="{E67F1A49-5343-410B-89E8-F003A9BFD862}" type="datetimeFigureOut">
               <a:rPr lang="en-US" smtClean="0"/>
-              <a:t>6/8/2019</a:t>
+              <a:t>6/14/2019</a:t>
             </a:fld>
             <a:endParaRPr lang="en-US"/>
           </a:p>
@@ -1242,7 +1242,7 @@
           <a:p>
             <a:fld id="{E67F1A49-5343-410B-89E8-F003A9BFD862}" type="datetimeFigureOut">
               <a:rPr lang="en-US" smtClean="0"/>
-              <a:t>6/8/2019</a:t>
+              <a:t>6/14/2019</a:t>
             </a:fld>
             <a:endParaRPr lang="en-US"/>
           </a:p>
@@ -1609,7 +1609,7 @@
           <a:p>
             <a:fld id="{E67F1A49-5343-410B-89E8-F003A9BFD862}" type="datetimeFigureOut">
               <a:rPr lang="en-US" smtClean="0"/>
-              <a:t>6/8/2019</a:t>
+              <a:t>6/14/2019</a:t>
             </a:fld>
             <a:endParaRPr lang="en-US"/>
           </a:p>
@@ -1727,7 +1727,7 @@
           <a:p>
             <a:fld id="{E67F1A49-5343-410B-89E8-F003A9BFD862}" type="datetimeFigureOut">
               <a:rPr lang="en-US" smtClean="0"/>
-              <a:t>6/8/2019</a:t>
+              <a:t>6/14/2019</a:t>
             </a:fld>
             <a:endParaRPr lang="en-US"/>
           </a:p>
@@ -1822,7 +1822,7 @@
           <a:p>
             <a:fld id="{E67F1A49-5343-410B-89E8-F003A9BFD862}" type="datetimeFigureOut">
               <a:rPr lang="en-US" smtClean="0"/>
-              <a:t>6/8/2019</a:t>
+              <a:t>6/14/2019</a:t>
             </a:fld>
             <a:endParaRPr lang="en-US"/>
           </a:p>
@@ -2099,7 +2099,7 @@
           <a:p>
             <a:fld id="{E67F1A49-5343-410B-89E8-F003A9BFD862}" type="datetimeFigureOut">
               <a:rPr lang="en-US" smtClean="0"/>
-              <a:t>6/8/2019</a:t>
+              <a:t>6/14/2019</a:t>
             </a:fld>
             <a:endParaRPr lang="en-US"/>
           </a:p>
@@ -2356,7 +2356,7 @@
           <a:p>
             <a:fld id="{E67F1A49-5343-410B-89E8-F003A9BFD862}" type="datetimeFigureOut">
               <a:rPr lang="en-US" smtClean="0"/>
-              <a:t>6/8/2019</a:t>
+              <a:t>6/14/2019</a:t>
             </a:fld>
             <a:endParaRPr lang="en-US"/>
           </a:p>
@@ -2569,7 +2569,7 @@
           <a:p>
             <a:fld id="{E67F1A49-5343-410B-89E8-F003A9BFD862}" type="datetimeFigureOut">
               <a:rPr lang="en-US" smtClean="0"/>
-              <a:t>6/8/2019</a:t>
+              <a:t>6/14/2019</a:t>
             </a:fld>
             <a:endParaRPr lang="en-US"/>
           </a:p>
@@ -3222,6 +3222,198 @@
           </a:extLst>
         </p:spPr>
       </p:pic>
+      <p:pic>
+        <p:nvPicPr>
+          <p:cNvPr id="6" name="Picture 2" descr="Image result for university icon png">
+            <a:extLst>
+              <a:ext uri="{FF2B5EF4-FFF2-40B4-BE49-F238E27FC236}">
+                <a16:creationId xmlns:a16="http://schemas.microsoft.com/office/drawing/2014/main" id="{B06C3ECE-800D-4D4C-AB02-C51E256B1ABD}"/>
+              </a:ext>
+            </a:extLst>
+          </p:cNvPr>
+          <p:cNvPicPr>
+            <a:picLocks noChangeAspect="1" noChangeArrowheads="1"/>
+          </p:cNvPicPr>
+          <p:nvPr/>
+        </p:nvPicPr>
+        <p:blipFill>
+          <a:blip r:embed="rId2">
+            <a:duotone>
+              <a:schemeClr val="accent1">
+                <a:shade val="45000"/>
+                <a:satMod val="135000"/>
+              </a:schemeClr>
+              <a:prstClr val="white"/>
+            </a:duotone>
+            <a:extLst>
+              <a:ext uri="{28A0092B-C50C-407E-A947-70E740481C1C}">
+                <a14:useLocalDpi xmlns:a14="http://schemas.microsoft.com/office/drawing/2010/main" val="0"/>
+              </a:ext>
+            </a:extLst>
+          </a:blip>
+          <a:srcRect/>
+          <a:stretch>
+            <a:fillRect/>
+          </a:stretch>
+        </p:blipFill>
+        <p:spPr bwMode="auto">
+          <a:xfrm>
+            <a:off x="6033365" y="1546814"/>
+            <a:ext cx="457200" cy="457200"/>
+          </a:xfrm>
+          <a:prstGeom prst="rect">
+            <a:avLst/>
+          </a:prstGeom>
+          <a:noFill/>
+          <a:effectLst>
+            <a:outerShdw blurRad="63500" sx="102000" sy="102000" algn="ctr" rotWithShape="0">
+              <a:schemeClr val="bg1">
+                <a:alpha val="40000"/>
+              </a:schemeClr>
+            </a:outerShdw>
+          </a:effectLst>
+          <a:extLst>
+            <a:ext uri="{909E8E84-426E-40DD-AFC4-6F175D3DCCD1}">
+              <a14:hiddenFill xmlns:a14="http://schemas.microsoft.com/office/drawing/2010/main">
+                <a:solidFill>
+                  <a:srgbClr val="FFFFFF"/>
+                </a:solidFill>
+              </a14:hiddenFill>
+            </a:ext>
+          </a:extLst>
+        </p:spPr>
+      </p:pic>
+      <p:pic>
+        <p:nvPicPr>
+          <p:cNvPr id="7" name="Picture 4" descr="Image result for work icon png">
+            <a:extLst>
+              <a:ext uri="{FF2B5EF4-FFF2-40B4-BE49-F238E27FC236}">
+                <a16:creationId xmlns:a16="http://schemas.microsoft.com/office/drawing/2014/main" id="{D28C078E-BF7A-49C5-B2BD-317E8D07610E}"/>
+              </a:ext>
+            </a:extLst>
+          </p:cNvPr>
+          <p:cNvPicPr>
+            <a:picLocks noChangeAspect="1" noChangeArrowheads="1"/>
+          </p:cNvPicPr>
+          <p:nvPr/>
+        </p:nvPicPr>
+        <p:blipFill>
+          <a:blip r:embed="rId3">
+            <a:duotone>
+              <a:schemeClr val="accent4">
+                <a:shade val="45000"/>
+                <a:satMod val="135000"/>
+              </a:schemeClr>
+              <a:prstClr val="white"/>
+            </a:duotone>
+            <a:extLst>
+              <a:ext uri="{BEBA8EAE-BF5A-486C-A8C5-ECC9F3942E4B}">
+                <a14:imgProps xmlns:a14="http://schemas.microsoft.com/office/drawing/2010/main">
+                  <a14:imgLayer r:embed="rId4">
+                    <a14:imgEffect>
+                      <a14:saturation sat="245000"/>
+                    </a14:imgEffect>
+                  </a14:imgLayer>
+                </a14:imgProps>
+              </a:ext>
+              <a:ext uri="{28A0092B-C50C-407E-A947-70E740481C1C}">
+                <a14:useLocalDpi xmlns:a14="http://schemas.microsoft.com/office/drawing/2010/main" val="0"/>
+              </a:ext>
+            </a:extLst>
+          </a:blip>
+          <a:srcRect/>
+          <a:stretch>
+            <a:fillRect/>
+          </a:stretch>
+        </p:blipFill>
+        <p:spPr bwMode="auto">
+          <a:xfrm>
+            <a:off x="7061564" y="1546814"/>
+            <a:ext cx="525252" cy="457200"/>
+          </a:xfrm>
+          <a:prstGeom prst="rect">
+            <a:avLst/>
+          </a:prstGeom>
+          <a:noFill/>
+          <a:effectLst>
+            <a:outerShdw blurRad="63500" sx="102000" sy="102000" algn="ctr" rotWithShape="0">
+              <a:schemeClr val="bg1">
+                <a:alpha val="40000"/>
+              </a:schemeClr>
+            </a:outerShdw>
+          </a:effectLst>
+          <a:extLst>
+            <a:ext uri="{909E8E84-426E-40DD-AFC4-6F175D3DCCD1}">
+              <a14:hiddenFill xmlns:a14="http://schemas.microsoft.com/office/drawing/2010/main">
+                <a:solidFill>
+                  <a:srgbClr val="FFFFFF"/>
+                </a:solidFill>
+              </a14:hiddenFill>
+            </a:ext>
+          </a:extLst>
+        </p:spPr>
+      </p:pic>
+      <p:pic>
+        <p:nvPicPr>
+          <p:cNvPr id="10" name="Picture 9" descr="Image result for international icon png">
+            <a:extLst>
+              <a:ext uri="{FF2B5EF4-FFF2-40B4-BE49-F238E27FC236}">
+                <a16:creationId xmlns:a16="http://schemas.microsoft.com/office/drawing/2014/main" id="{C3C050CD-3E68-4AF3-B8E8-11495CD32948}"/>
+              </a:ext>
+            </a:extLst>
+          </p:cNvPr>
+          <p:cNvPicPr>
+            <a:picLocks noChangeArrowheads="1"/>
+          </p:cNvPicPr>
+          <p:nvPr/>
+        </p:nvPicPr>
+        <p:blipFill>
+          <a:blip r:embed="rId5">
+            <a:duotone>
+              <a:schemeClr val="accent6">
+                <a:shade val="45000"/>
+                <a:satMod val="135000"/>
+              </a:schemeClr>
+              <a:prstClr val="white"/>
+            </a:duotone>
+            <a:extLst>
+              <a:ext uri="{28A0092B-C50C-407E-A947-70E740481C1C}">
+                <a14:useLocalDpi xmlns:a14="http://schemas.microsoft.com/office/drawing/2010/main" val="0"/>
+              </a:ext>
+            </a:extLst>
+          </a:blip>
+          <a:srcRect/>
+          <a:stretch>
+            <a:fillRect/>
+          </a:stretch>
+        </p:blipFill>
+        <p:spPr bwMode="auto">
+          <a:xfrm>
+            <a:off x="8000334" y="1561462"/>
+            <a:ext cx="457200" cy="457200"/>
+          </a:xfrm>
+          <a:prstGeom prst="rect">
+            <a:avLst/>
+          </a:prstGeom>
+          <a:noFill/>
+          <a:effectLst>
+            <a:outerShdw blurRad="63500" sx="102000" sy="102000" algn="ctr" rotWithShape="0">
+              <a:schemeClr val="bg1">
+                <a:alpha val="40000"/>
+              </a:schemeClr>
+            </a:outerShdw>
+          </a:effectLst>
+          <a:extLst>
+            <a:ext uri="{909E8E84-426E-40DD-AFC4-6F175D3DCCD1}">
+              <a14:hiddenFill xmlns:a14="http://schemas.microsoft.com/office/drawing/2010/main">
+                <a:solidFill>
+                  <a:srgbClr val="FFFFFF"/>
+                </a:solidFill>
+              </a14:hiddenFill>
+            </a:ext>
+          </a:extLst>
+        </p:spPr>
+      </p:pic>
     </p:spTree>
     <p:extLst>
       <p:ext uri="{BB962C8B-B14F-4D97-AF65-F5344CB8AC3E}">

</xml_diff>

<commit_message>
redesigned timeline and all associated elements
</commit_message>
<xml_diff>
--- a/assets/images/pptx.pptx
+++ b/assets/images/pptx.pptx
@@ -6,7 +6,8 @@
   </p:sldMasterIdLst>
   <p:sldIdLst>
     <p:sldId id="256" r:id="rId2"/>
-    <p:sldId id="257" r:id="rId3"/>
+    <p:sldId id="258" r:id="rId3"/>
+    <p:sldId id="257" r:id="rId4"/>
   </p:sldIdLst>
   <p:sldSz cx="12192000" cy="6858000"/>
   <p:notesSz cx="6858000" cy="9144000"/>
@@ -244,7 +245,7 @@
           <a:p>
             <a:fld id="{E67F1A49-5343-410B-89E8-F003A9BFD862}" type="datetimeFigureOut">
               <a:rPr lang="en-US" smtClean="0"/>
-              <a:t>6/14/2019</a:t>
+              <a:t>6/16/2019</a:t>
             </a:fld>
             <a:endParaRPr lang="en-US"/>
           </a:p>
@@ -414,7 +415,7 @@
           <a:p>
             <a:fld id="{E67F1A49-5343-410B-89E8-F003A9BFD862}" type="datetimeFigureOut">
               <a:rPr lang="en-US" smtClean="0"/>
-              <a:t>6/14/2019</a:t>
+              <a:t>6/16/2019</a:t>
             </a:fld>
             <a:endParaRPr lang="en-US"/>
           </a:p>
@@ -594,7 +595,7 @@
           <a:p>
             <a:fld id="{E67F1A49-5343-410B-89E8-F003A9BFD862}" type="datetimeFigureOut">
               <a:rPr lang="en-US" smtClean="0"/>
-              <a:t>6/14/2019</a:t>
+              <a:t>6/16/2019</a:t>
             </a:fld>
             <a:endParaRPr lang="en-US"/>
           </a:p>
@@ -764,7 +765,7 @@
           <a:p>
             <a:fld id="{E67F1A49-5343-410B-89E8-F003A9BFD862}" type="datetimeFigureOut">
               <a:rPr lang="en-US" smtClean="0"/>
-              <a:t>6/14/2019</a:t>
+              <a:t>6/16/2019</a:t>
             </a:fld>
             <a:endParaRPr lang="en-US"/>
           </a:p>
@@ -1010,7 +1011,7 @@
           <a:p>
             <a:fld id="{E67F1A49-5343-410B-89E8-F003A9BFD862}" type="datetimeFigureOut">
               <a:rPr lang="en-US" smtClean="0"/>
-              <a:t>6/14/2019</a:t>
+              <a:t>6/16/2019</a:t>
             </a:fld>
             <a:endParaRPr lang="en-US"/>
           </a:p>
@@ -1242,7 +1243,7 @@
           <a:p>
             <a:fld id="{E67F1A49-5343-410B-89E8-F003A9BFD862}" type="datetimeFigureOut">
               <a:rPr lang="en-US" smtClean="0"/>
-              <a:t>6/14/2019</a:t>
+              <a:t>6/16/2019</a:t>
             </a:fld>
             <a:endParaRPr lang="en-US"/>
           </a:p>
@@ -1609,7 +1610,7 @@
           <a:p>
             <a:fld id="{E67F1A49-5343-410B-89E8-F003A9BFD862}" type="datetimeFigureOut">
               <a:rPr lang="en-US" smtClean="0"/>
-              <a:t>6/14/2019</a:t>
+              <a:t>6/16/2019</a:t>
             </a:fld>
             <a:endParaRPr lang="en-US"/>
           </a:p>
@@ -1727,7 +1728,7 @@
           <a:p>
             <a:fld id="{E67F1A49-5343-410B-89E8-F003A9BFD862}" type="datetimeFigureOut">
               <a:rPr lang="en-US" smtClean="0"/>
-              <a:t>6/14/2019</a:t>
+              <a:t>6/16/2019</a:t>
             </a:fld>
             <a:endParaRPr lang="en-US"/>
           </a:p>
@@ -1822,7 +1823,7 @@
           <a:p>
             <a:fld id="{E67F1A49-5343-410B-89E8-F003A9BFD862}" type="datetimeFigureOut">
               <a:rPr lang="en-US" smtClean="0"/>
-              <a:t>6/14/2019</a:t>
+              <a:t>6/16/2019</a:t>
             </a:fld>
             <a:endParaRPr lang="en-US"/>
           </a:p>
@@ -2099,7 +2100,7 @@
           <a:p>
             <a:fld id="{E67F1A49-5343-410B-89E8-F003A9BFD862}" type="datetimeFigureOut">
               <a:rPr lang="en-US" smtClean="0"/>
-              <a:t>6/14/2019</a:t>
+              <a:t>6/16/2019</a:t>
             </a:fld>
             <a:endParaRPr lang="en-US"/>
           </a:p>
@@ -2356,7 +2357,7 @@
           <a:p>
             <a:fld id="{E67F1A49-5343-410B-89E8-F003A9BFD862}" type="datetimeFigureOut">
               <a:rPr lang="en-US" smtClean="0"/>
-              <a:t>6/14/2019</a:t>
+              <a:t>6/16/2019</a:t>
             </a:fld>
             <a:endParaRPr lang="en-US"/>
           </a:p>
@@ -2569,7 +2570,7 @@
           <a:p>
             <a:fld id="{E67F1A49-5343-410B-89E8-F003A9BFD862}" type="datetimeFigureOut">
               <a:rPr lang="en-US" smtClean="0"/>
-              <a:t>6/14/2019</a:t>
+              <a:t>6/16/2019</a:t>
             </a:fld>
             <a:endParaRPr lang="en-US"/>
           </a:p>
@@ -3444,6 +3445,438 @@
           <a:chExt cx="0" cy="0"/>
         </a:xfrm>
       </p:grpSpPr>
+      <p:pic>
+        <p:nvPicPr>
+          <p:cNvPr id="1026" name="Picture 2" descr="Image result for university icon png">
+            <a:extLst>
+              <a:ext uri="{FF2B5EF4-FFF2-40B4-BE49-F238E27FC236}">
+                <a16:creationId xmlns:a16="http://schemas.microsoft.com/office/drawing/2014/main" id="{55D94679-A61C-47C6-9F03-C3A531282C61}"/>
+              </a:ext>
+            </a:extLst>
+          </p:cNvPr>
+          <p:cNvPicPr>
+            <a:picLocks noChangeAspect="1" noChangeArrowheads="1"/>
+          </p:cNvPicPr>
+          <p:nvPr/>
+        </p:nvPicPr>
+        <p:blipFill>
+          <a:blip r:embed="rId2">
+            <a:duotone>
+              <a:schemeClr val="accent1">
+                <a:shade val="45000"/>
+                <a:satMod val="135000"/>
+              </a:schemeClr>
+              <a:prstClr val="white"/>
+            </a:duotone>
+            <a:extLst>
+              <a:ext uri="{28A0092B-C50C-407E-A947-70E740481C1C}">
+                <a14:useLocalDpi xmlns:a14="http://schemas.microsoft.com/office/drawing/2010/main" val="0"/>
+              </a:ext>
+            </a:extLst>
+          </a:blip>
+          <a:srcRect/>
+          <a:stretch>
+            <a:fillRect/>
+          </a:stretch>
+        </p:blipFill>
+        <p:spPr bwMode="auto">
+          <a:xfrm>
+            <a:off x="6652730" y="728158"/>
+            <a:ext cx="228600" cy="228600"/>
+          </a:xfrm>
+          <a:prstGeom prst="rect">
+            <a:avLst/>
+          </a:prstGeom>
+          <a:noFill/>
+          <a:effectLst>
+            <a:outerShdw blurRad="63500" sx="102000" sy="102000" algn="ctr" rotWithShape="0">
+              <a:schemeClr val="bg1">
+                <a:alpha val="40000"/>
+              </a:schemeClr>
+            </a:outerShdw>
+          </a:effectLst>
+          <a:extLst>
+            <a:ext uri="{909E8E84-426E-40DD-AFC4-6F175D3DCCD1}">
+              <a14:hiddenFill xmlns:a14="http://schemas.microsoft.com/office/drawing/2010/main">
+                <a:solidFill>
+                  <a:srgbClr val="FFFFFF"/>
+                </a:solidFill>
+              </a14:hiddenFill>
+            </a:ext>
+          </a:extLst>
+        </p:spPr>
+      </p:pic>
+      <p:pic>
+        <p:nvPicPr>
+          <p:cNvPr id="8" name="Picture 4" descr="Image result for work icon png">
+            <a:extLst>
+              <a:ext uri="{FF2B5EF4-FFF2-40B4-BE49-F238E27FC236}">
+                <a16:creationId xmlns:a16="http://schemas.microsoft.com/office/drawing/2014/main" id="{6F643295-2041-4973-8817-C2493ED1A7E8}"/>
+              </a:ext>
+            </a:extLst>
+          </p:cNvPr>
+          <p:cNvPicPr>
+            <a:picLocks noChangeAspect="1" noChangeArrowheads="1"/>
+          </p:cNvPicPr>
+          <p:nvPr/>
+        </p:nvPicPr>
+        <p:blipFill>
+          <a:blip r:embed="rId3">
+            <a:duotone>
+              <a:schemeClr val="accent4">
+                <a:shade val="45000"/>
+                <a:satMod val="135000"/>
+              </a:schemeClr>
+              <a:prstClr val="white"/>
+            </a:duotone>
+            <a:extLst>
+              <a:ext uri="{BEBA8EAE-BF5A-486C-A8C5-ECC9F3942E4B}">
+                <a14:imgProps xmlns:a14="http://schemas.microsoft.com/office/drawing/2010/main">
+                  <a14:imgLayer r:embed="rId4">
+                    <a14:imgEffect>
+                      <a14:saturation sat="245000"/>
+                    </a14:imgEffect>
+                  </a14:imgLayer>
+                </a14:imgProps>
+              </a:ext>
+              <a:ext uri="{28A0092B-C50C-407E-A947-70E740481C1C}">
+                <a14:useLocalDpi xmlns:a14="http://schemas.microsoft.com/office/drawing/2010/main" val="0"/>
+              </a:ext>
+            </a:extLst>
+          </a:blip>
+          <a:srcRect/>
+          <a:stretch>
+            <a:fillRect/>
+          </a:stretch>
+        </p:blipFill>
+        <p:spPr bwMode="auto">
+          <a:xfrm>
+            <a:off x="7300103" y="728158"/>
+            <a:ext cx="262626" cy="228600"/>
+          </a:xfrm>
+          <a:prstGeom prst="rect">
+            <a:avLst/>
+          </a:prstGeom>
+          <a:noFill/>
+          <a:effectLst>
+            <a:outerShdw blurRad="63500" sx="102000" sy="102000" algn="ctr" rotWithShape="0">
+              <a:schemeClr val="bg1">
+                <a:alpha val="40000"/>
+              </a:schemeClr>
+            </a:outerShdw>
+          </a:effectLst>
+          <a:extLst>
+            <a:ext uri="{909E8E84-426E-40DD-AFC4-6F175D3DCCD1}">
+              <a14:hiddenFill xmlns:a14="http://schemas.microsoft.com/office/drawing/2010/main">
+                <a:solidFill>
+                  <a:srgbClr val="FFFFFF"/>
+                </a:solidFill>
+              </a14:hiddenFill>
+            </a:ext>
+          </a:extLst>
+        </p:spPr>
+      </p:pic>
+      <p:pic>
+        <p:nvPicPr>
+          <p:cNvPr id="9" name="Picture 8" descr="Image result for international icon png">
+            <a:extLst>
+              <a:ext uri="{FF2B5EF4-FFF2-40B4-BE49-F238E27FC236}">
+                <a16:creationId xmlns:a16="http://schemas.microsoft.com/office/drawing/2014/main" id="{73901460-180E-4B69-B519-F3CA273F070D}"/>
+              </a:ext>
+            </a:extLst>
+          </p:cNvPr>
+          <p:cNvPicPr>
+            <a:picLocks noChangeArrowheads="1"/>
+          </p:cNvPicPr>
+          <p:nvPr/>
+        </p:nvPicPr>
+        <p:blipFill>
+          <a:blip r:embed="rId5">
+            <a:duotone>
+              <a:schemeClr val="accent6">
+                <a:shade val="45000"/>
+                <a:satMod val="135000"/>
+              </a:schemeClr>
+              <a:prstClr val="white"/>
+            </a:duotone>
+            <a:extLst>
+              <a:ext uri="{28A0092B-C50C-407E-A947-70E740481C1C}">
+                <a14:useLocalDpi xmlns:a14="http://schemas.microsoft.com/office/drawing/2010/main" val="0"/>
+              </a:ext>
+            </a:extLst>
+          </a:blip>
+          <a:srcRect/>
+          <a:stretch>
+            <a:fillRect/>
+          </a:stretch>
+        </p:blipFill>
+        <p:spPr bwMode="auto">
+          <a:xfrm>
+            <a:off x="7981502" y="728158"/>
+            <a:ext cx="228600" cy="228600"/>
+          </a:xfrm>
+          <a:prstGeom prst="rect">
+            <a:avLst/>
+          </a:prstGeom>
+          <a:noFill/>
+          <a:effectLst>
+            <a:outerShdw blurRad="63500" sx="102000" sy="102000" algn="ctr" rotWithShape="0">
+              <a:schemeClr val="bg1">
+                <a:alpha val="40000"/>
+              </a:schemeClr>
+            </a:outerShdw>
+          </a:effectLst>
+          <a:extLst>
+            <a:ext uri="{909E8E84-426E-40DD-AFC4-6F175D3DCCD1}">
+              <a14:hiddenFill xmlns:a14="http://schemas.microsoft.com/office/drawing/2010/main">
+                <a:solidFill>
+                  <a:srgbClr val="FFFFFF"/>
+                </a:solidFill>
+              </a14:hiddenFill>
+            </a:ext>
+          </a:extLst>
+        </p:spPr>
+      </p:pic>
+      <p:pic>
+        <p:nvPicPr>
+          <p:cNvPr id="6" name="Picture 2" descr="Image result for university icon png">
+            <a:extLst>
+              <a:ext uri="{FF2B5EF4-FFF2-40B4-BE49-F238E27FC236}">
+                <a16:creationId xmlns:a16="http://schemas.microsoft.com/office/drawing/2014/main" id="{B06C3ECE-800D-4D4C-AB02-C51E256B1ABD}"/>
+              </a:ext>
+            </a:extLst>
+          </p:cNvPr>
+          <p:cNvPicPr>
+            <a:picLocks noChangeAspect="1" noChangeArrowheads="1"/>
+          </p:cNvPicPr>
+          <p:nvPr/>
+        </p:nvPicPr>
+        <p:blipFill>
+          <a:blip r:embed="rId2">
+            <a:duotone>
+              <a:schemeClr val="bg2">
+                <a:shade val="45000"/>
+                <a:satMod val="135000"/>
+              </a:schemeClr>
+              <a:prstClr val="white"/>
+            </a:duotone>
+            <a:extLst>
+              <a:ext uri="{28A0092B-C50C-407E-A947-70E740481C1C}">
+                <a14:useLocalDpi xmlns:a14="http://schemas.microsoft.com/office/drawing/2010/main" val="0"/>
+              </a:ext>
+            </a:extLst>
+          </a:blip>
+          <a:srcRect/>
+          <a:stretch>
+            <a:fillRect/>
+          </a:stretch>
+        </p:blipFill>
+        <p:spPr bwMode="auto">
+          <a:xfrm>
+            <a:off x="6033365" y="1546814"/>
+            <a:ext cx="457200" cy="457200"/>
+          </a:xfrm>
+          <a:prstGeom prst="rect">
+            <a:avLst/>
+          </a:prstGeom>
+          <a:noFill/>
+          <a:effectLst>
+            <a:glow rad="12700">
+              <a:schemeClr val="accent1">
+                <a:satMod val="175000"/>
+                <a:alpha val="40000"/>
+              </a:schemeClr>
+            </a:glow>
+            <a:outerShdw blurRad="63500" sx="102000" sy="102000" algn="ctr" rotWithShape="0">
+              <a:schemeClr val="accent1">
+                <a:lumMod val="60000"/>
+                <a:lumOff val="40000"/>
+                <a:alpha val="70000"/>
+              </a:schemeClr>
+            </a:outerShdw>
+          </a:effectLst>
+          <a:extLst>
+            <a:ext uri="{909E8E84-426E-40DD-AFC4-6F175D3DCCD1}">
+              <a14:hiddenFill xmlns:a14="http://schemas.microsoft.com/office/drawing/2010/main">
+                <a:solidFill>
+                  <a:srgbClr val="FFFFFF"/>
+                </a:solidFill>
+              </a14:hiddenFill>
+            </a:ext>
+          </a:extLst>
+        </p:spPr>
+      </p:pic>
+      <p:pic>
+        <p:nvPicPr>
+          <p:cNvPr id="7" name="Picture 4" descr="Image result for work icon png">
+            <a:extLst>
+              <a:ext uri="{FF2B5EF4-FFF2-40B4-BE49-F238E27FC236}">
+                <a16:creationId xmlns:a16="http://schemas.microsoft.com/office/drawing/2014/main" id="{D28C078E-BF7A-49C5-B2BD-317E8D07610E}"/>
+              </a:ext>
+            </a:extLst>
+          </p:cNvPr>
+          <p:cNvPicPr>
+            <a:picLocks noChangeAspect="1" noChangeArrowheads="1"/>
+          </p:cNvPicPr>
+          <p:nvPr/>
+        </p:nvPicPr>
+        <p:blipFill>
+          <a:blip r:embed="rId3">
+            <a:duotone>
+              <a:schemeClr val="bg2">
+                <a:shade val="45000"/>
+                <a:satMod val="135000"/>
+              </a:schemeClr>
+              <a:prstClr val="white"/>
+            </a:duotone>
+            <a:extLst>
+              <a:ext uri="{BEBA8EAE-BF5A-486C-A8C5-ECC9F3942E4B}">
+                <a14:imgProps xmlns:a14="http://schemas.microsoft.com/office/drawing/2010/main">
+                  <a14:imgLayer r:embed="rId4">
+                    <a14:imgEffect>
+                      <a14:saturation sat="245000"/>
+                    </a14:imgEffect>
+                  </a14:imgLayer>
+                </a14:imgProps>
+              </a:ext>
+              <a:ext uri="{28A0092B-C50C-407E-A947-70E740481C1C}">
+                <a14:useLocalDpi xmlns:a14="http://schemas.microsoft.com/office/drawing/2010/main" val="0"/>
+              </a:ext>
+            </a:extLst>
+          </a:blip>
+          <a:srcRect/>
+          <a:stretch>
+            <a:fillRect/>
+          </a:stretch>
+        </p:blipFill>
+        <p:spPr bwMode="auto">
+          <a:xfrm>
+            <a:off x="7061564" y="1546814"/>
+            <a:ext cx="525252" cy="457200"/>
+          </a:xfrm>
+          <a:prstGeom prst="rect">
+            <a:avLst/>
+          </a:prstGeom>
+          <a:noFill/>
+          <a:effectLst>
+            <a:glow rad="12700">
+              <a:schemeClr val="accent4">
+                <a:alpha val="40000"/>
+              </a:schemeClr>
+            </a:glow>
+            <a:outerShdw blurRad="63500" sx="102000" sy="102000" algn="ctr" rotWithShape="0">
+              <a:schemeClr val="accent4">
+                <a:alpha val="70000"/>
+              </a:schemeClr>
+            </a:outerShdw>
+          </a:effectLst>
+          <a:extLst>
+            <a:ext uri="{909E8E84-426E-40DD-AFC4-6F175D3DCCD1}">
+              <a14:hiddenFill xmlns:a14="http://schemas.microsoft.com/office/drawing/2010/main">
+                <a:solidFill>
+                  <a:srgbClr val="FFFFFF"/>
+                </a:solidFill>
+              </a14:hiddenFill>
+            </a:ext>
+          </a:extLst>
+        </p:spPr>
+      </p:pic>
+      <p:pic>
+        <p:nvPicPr>
+          <p:cNvPr id="10" name="Picture 9" descr="Image result for international icon png">
+            <a:extLst>
+              <a:ext uri="{FF2B5EF4-FFF2-40B4-BE49-F238E27FC236}">
+                <a16:creationId xmlns:a16="http://schemas.microsoft.com/office/drawing/2014/main" id="{C3C050CD-3E68-4AF3-B8E8-11495CD32948}"/>
+              </a:ext>
+            </a:extLst>
+          </p:cNvPr>
+          <p:cNvPicPr>
+            <a:picLocks noChangeArrowheads="1"/>
+          </p:cNvPicPr>
+          <p:nvPr/>
+        </p:nvPicPr>
+        <p:blipFill>
+          <a:blip r:embed="rId5">
+            <a:duotone>
+              <a:schemeClr val="bg2">
+                <a:shade val="45000"/>
+                <a:satMod val="135000"/>
+              </a:schemeClr>
+              <a:prstClr val="white"/>
+            </a:duotone>
+            <a:extLst>
+              <a:ext uri="{28A0092B-C50C-407E-A947-70E740481C1C}">
+                <a14:useLocalDpi xmlns:a14="http://schemas.microsoft.com/office/drawing/2010/main" val="0"/>
+              </a:ext>
+            </a:extLst>
+          </a:blip>
+          <a:srcRect/>
+          <a:stretch>
+            <a:fillRect/>
+          </a:stretch>
+        </p:blipFill>
+        <p:spPr bwMode="auto">
+          <a:xfrm>
+            <a:off x="8000334" y="1561462"/>
+            <a:ext cx="457200" cy="457200"/>
+          </a:xfrm>
+          <a:prstGeom prst="rect">
+            <a:avLst/>
+          </a:prstGeom>
+          <a:noFill/>
+          <a:effectLst>
+            <a:glow rad="12700">
+              <a:schemeClr val="accent6">
+                <a:alpha val="40000"/>
+              </a:schemeClr>
+            </a:glow>
+            <a:outerShdw blurRad="50800" sx="102000" sy="102000" algn="ctr" rotWithShape="0">
+              <a:schemeClr val="accent6">
+                <a:alpha val="70000"/>
+              </a:schemeClr>
+            </a:outerShdw>
+          </a:effectLst>
+          <a:extLst>
+            <a:ext uri="{909E8E84-426E-40DD-AFC4-6F175D3DCCD1}">
+              <a14:hiddenFill xmlns:a14="http://schemas.microsoft.com/office/drawing/2010/main">
+                <a:solidFill>
+                  <a:srgbClr val="FFFFFF"/>
+                </a:solidFill>
+              </a14:hiddenFill>
+            </a:ext>
+          </a:extLst>
+        </p:spPr>
+      </p:pic>
+    </p:spTree>
+    <p:extLst>
+      <p:ext uri="{BB962C8B-B14F-4D97-AF65-F5344CB8AC3E}">
+        <p14:creationId xmlns:p14="http://schemas.microsoft.com/office/powerpoint/2010/main" val="2192356826"/>
+      </p:ext>
+    </p:extLst>
+  </p:cSld>
+  <p:clrMapOvr>
+    <a:masterClrMapping/>
+  </p:clrMapOvr>
+</p:sld>
+</file>
+
+<file path=ppt/slides/slide3.xml><?xml version="1.0" encoding="utf-8"?>
+<p:sld xmlns:a="http://schemas.openxmlformats.org/drawingml/2006/main" xmlns:r="http://schemas.openxmlformats.org/officeDocument/2006/relationships" xmlns:p="http://schemas.openxmlformats.org/presentationml/2006/main">
+  <p:cSld>
+    <p:spTree>
+      <p:nvGrpSpPr>
+        <p:cNvPr id="1" name=""/>
+        <p:cNvGrpSpPr/>
+        <p:nvPr/>
+      </p:nvGrpSpPr>
+      <p:grpSpPr>
+        <a:xfrm>
+          <a:off x="0" y="0"/>
+          <a:ext cx="0" cy="0"/>
+          <a:chOff x="0" y="0"/>
+          <a:chExt cx="0" cy="0"/>
+        </a:xfrm>
+      </p:grpSpPr>
       <p:sp>
         <p:nvSpPr>
           <p:cNvPr id="35" name="Rectangle 34">

</xml_diff>